<commit_message>
Class period 13 finish
</commit_message>
<xml_diff>
--- a/PPT/Class period 12.pptx
+++ b/PPT/Class period 12.pptx
@@ -111,6 +111,11 @@
       </a:defRPr>
     </a:lvl9pPr>
   </p:defaultTextStyle>
+  <p:extLst>
+    <p:ext uri="{EFAFB233-063F-42B5-8137-9DF3F51BA10A}">
+      <p15:sldGuideLst xmlns:p15="http://schemas.microsoft.com/office/powerpoint/2012/main"/>
+    </p:ext>
+  </p:extLst>
 </p:presentation>
 </file>
 
@@ -261,7 +266,7 @@
           <a:p>
             <a:fld id="{E10378E5-6EF0-46B6-A2C4-A173DBC89C5F}" type="datetimeFigureOut">
               <a:rPr lang="en-US" smtClean="0"/>
-              <a:t>3/15/2024</a:t>
+              <a:t>3/18/2024</a:t>
             </a:fld>
             <a:endParaRPr lang="en-US"/>
           </a:p>
@@ -459,7 +464,7 @@
           <a:p>
             <a:fld id="{E10378E5-6EF0-46B6-A2C4-A173DBC89C5F}" type="datetimeFigureOut">
               <a:rPr lang="en-US" smtClean="0"/>
-              <a:t>3/15/2024</a:t>
+              <a:t>3/18/2024</a:t>
             </a:fld>
             <a:endParaRPr lang="en-US"/>
           </a:p>
@@ -667,7 +672,7 @@
           <a:p>
             <a:fld id="{E10378E5-6EF0-46B6-A2C4-A173DBC89C5F}" type="datetimeFigureOut">
               <a:rPr lang="en-US" smtClean="0"/>
-              <a:t>3/15/2024</a:t>
+              <a:t>3/18/2024</a:t>
             </a:fld>
             <a:endParaRPr lang="en-US"/>
           </a:p>
@@ -865,7 +870,7 @@
           <a:p>
             <a:fld id="{E10378E5-6EF0-46B6-A2C4-A173DBC89C5F}" type="datetimeFigureOut">
               <a:rPr lang="en-US" smtClean="0"/>
-              <a:t>3/15/2024</a:t>
+              <a:t>3/18/2024</a:t>
             </a:fld>
             <a:endParaRPr lang="en-US"/>
           </a:p>
@@ -1140,7 +1145,7 @@
           <a:p>
             <a:fld id="{E10378E5-6EF0-46B6-A2C4-A173DBC89C5F}" type="datetimeFigureOut">
               <a:rPr lang="en-US" smtClean="0"/>
-              <a:t>3/15/2024</a:t>
+              <a:t>3/18/2024</a:t>
             </a:fld>
             <a:endParaRPr lang="en-US"/>
           </a:p>
@@ -1405,7 +1410,7 @@
           <a:p>
             <a:fld id="{E10378E5-6EF0-46B6-A2C4-A173DBC89C5F}" type="datetimeFigureOut">
               <a:rPr lang="en-US" smtClean="0"/>
-              <a:t>3/15/2024</a:t>
+              <a:t>3/18/2024</a:t>
             </a:fld>
             <a:endParaRPr lang="en-US"/>
           </a:p>
@@ -1817,7 +1822,7 @@
           <a:p>
             <a:fld id="{E10378E5-6EF0-46B6-A2C4-A173DBC89C5F}" type="datetimeFigureOut">
               <a:rPr lang="en-US" smtClean="0"/>
-              <a:t>3/15/2024</a:t>
+              <a:t>3/18/2024</a:t>
             </a:fld>
             <a:endParaRPr lang="en-US"/>
           </a:p>
@@ -1958,7 +1963,7 @@
           <a:p>
             <a:fld id="{E10378E5-6EF0-46B6-A2C4-A173DBC89C5F}" type="datetimeFigureOut">
               <a:rPr lang="en-US" smtClean="0"/>
-              <a:t>3/15/2024</a:t>
+              <a:t>3/18/2024</a:t>
             </a:fld>
             <a:endParaRPr lang="en-US"/>
           </a:p>
@@ -2071,7 +2076,7 @@
           <a:p>
             <a:fld id="{E10378E5-6EF0-46B6-A2C4-A173DBC89C5F}" type="datetimeFigureOut">
               <a:rPr lang="en-US" smtClean="0"/>
-              <a:t>3/15/2024</a:t>
+              <a:t>3/18/2024</a:t>
             </a:fld>
             <a:endParaRPr lang="en-US"/>
           </a:p>
@@ -2382,7 +2387,7 @@
           <a:p>
             <a:fld id="{E10378E5-6EF0-46B6-A2C4-A173DBC89C5F}" type="datetimeFigureOut">
               <a:rPr lang="en-US" smtClean="0"/>
-              <a:t>3/15/2024</a:t>
+              <a:t>3/18/2024</a:t>
             </a:fld>
             <a:endParaRPr lang="en-US"/>
           </a:p>
@@ -2670,7 +2675,7 @@
           <a:p>
             <a:fld id="{E10378E5-6EF0-46B6-A2C4-A173DBC89C5F}" type="datetimeFigureOut">
               <a:rPr lang="en-US" smtClean="0"/>
-              <a:t>3/15/2024</a:t>
+              <a:t>3/18/2024</a:t>
             </a:fld>
             <a:endParaRPr lang="en-US"/>
           </a:p>
@@ -2911,7 +2916,7 @@
           <a:p>
             <a:fld id="{E10378E5-6EF0-46B6-A2C4-A173DBC89C5F}" type="datetimeFigureOut">
               <a:rPr lang="en-US" smtClean="0"/>
-              <a:t>3/15/2024</a:t>
+              <a:t>3/18/2024</a:t>
             </a:fld>
             <a:endParaRPr lang="en-US"/>
           </a:p>
@@ -4233,7 +4238,7 @@
                 <a:effectLst/>
                 <a:latin typeface="Courier New" panose="02070309020205020404" pitchFamily="49" charset="0"/>
               </a:rPr>
-              <a:t>PetalWidth</a:t>
+              <a:t>SepalLength</a:t>
             </a:r>
             <a:r>
               <a:rPr lang="en-US" b="0" i="0" dirty="0">
@@ -4289,52 +4294,22 @@
           </a:prstGeom>
         </p:spPr>
       </p:pic>
-      <p:pic>
-        <p:nvPicPr>
-          <p:cNvPr id="7" name="Picture 6">
-            <a:extLst>
-              <a:ext uri="{FF2B5EF4-FFF2-40B4-BE49-F238E27FC236}">
-                <a16:creationId xmlns:a16="http://schemas.microsoft.com/office/drawing/2014/main" id="{9D2FAEE4-C1CC-355E-6626-65BB82B4CF62}"/>
-              </a:ext>
-            </a:extLst>
-          </p:cNvPr>
-          <p:cNvPicPr>
-            <a:picLocks noChangeAspect="1"/>
-          </p:cNvPicPr>
+      <p:sp>
+        <p:nvSpPr>
+          <p:cNvPr id="8" name="Rectangle 7">
+            <a:extLst>
+              <a:ext uri="{FF2B5EF4-FFF2-40B4-BE49-F238E27FC236}">
+                <a16:creationId xmlns:a16="http://schemas.microsoft.com/office/drawing/2014/main" id="{542B25EE-9816-7238-BD92-485B34AC6B17}"/>
+              </a:ext>
+            </a:extLst>
+          </p:cNvPr>
+          <p:cNvSpPr/>
           <p:nvPr/>
-        </p:nvPicPr>
-        <p:blipFill>
-          <a:blip r:embed="rId3"/>
-          <a:stretch>
-            <a:fillRect/>
-          </a:stretch>
-        </p:blipFill>
+        </p:nvSpPr>
         <p:spPr>
           <a:xfrm>
-            <a:off x="6096000" y="3794125"/>
-            <a:ext cx="4403593" cy="3063875"/>
-          </a:xfrm>
-          <a:prstGeom prst="rect">
-            <a:avLst/>
-          </a:prstGeom>
-        </p:spPr>
-      </p:pic>
-      <p:sp>
-        <p:nvSpPr>
-          <p:cNvPr id="8" name="Rectangle 7">
-            <a:extLst>
-              <a:ext uri="{FF2B5EF4-FFF2-40B4-BE49-F238E27FC236}">
-                <a16:creationId xmlns:a16="http://schemas.microsoft.com/office/drawing/2014/main" id="{542B25EE-9816-7238-BD92-485B34AC6B17}"/>
-              </a:ext>
-            </a:extLst>
-          </p:cNvPr>
-          <p:cNvSpPr/>
-          <p:nvPr/>
-        </p:nvSpPr>
-        <p:spPr>
-          <a:xfrm>
-            <a:off x="2945804" y="4065759"/>
-            <a:ext cx="1878677" cy="2092458"/>
+            <a:off x="1033877" y="4001294"/>
+            <a:ext cx="1044305" cy="2092458"/>
           </a:xfrm>
           <a:prstGeom prst="rect">
             <a:avLst/>
@@ -4371,6 +4346,88 @@
           </a:p>
         </p:txBody>
       </p:sp>
+      <p:sp>
+        <p:nvSpPr>
+          <p:cNvPr id="4" name="Rectangle 3">
+            <a:extLst>
+              <a:ext uri="{FF2B5EF4-FFF2-40B4-BE49-F238E27FC236}">
+                <a16:creationId xmlns:a16="http://schemas.microsoft.com/office/drawing/2014/main" id="{7C78989A-9368-5FE4-6BD5-4F4FDB7B5F84}"/>
+              </a:ext>
+            </a:extLst>
+          </p:cNvPr>
+          <p:cNvSpPr/>
+          <p:nvPr/>
+        </p:nvSpPr>
+        <p:spPr>
+          <a:xfrm>
+            <a:off x="2944948" y="4001294"/>
+            <a:ext cx="1044305" cy="2129950"/>
+          </a:xfrm>
+          <a:prstGeom prst="rect">
+            <a:avLst/>
+          </a:prstGeom>
+          <a:noFill/>
+          <a:ln>
+            <a:solidFill>
+              <a:srgbClr val="92D050"/>
+            </a:solidFill>
+          </a:ln>
+        </p:spPr>
+        <p:style>
+          <a:lnRef idx="2">
+            <a:schemeClr val="accent1">
+              <a:shade val="15000"/>
+            </a:schemeClr>
+          </a:lnRef>
+          <a:fillRef idx="1">
+            <a:schemeClr val="accent1"/>
+          </a:fillRef>
+          <a:effectRef idx="0">
+            <a:schemeClr val="accent1"/>
+          </a:effectRef>
+          <a:fontRef idx="minor">
+            <a:schemeClr val="lt1"/>
+          </a:fontRef>
+        </p:style>
+        <p:txBody>
+          <a:bodyPr rtlCol="0" anchor="ctr"/>
+          <a:lstStyle/>
+          <a:p>
+            <a:pPr algn="ctr"/>
+            <a:endParaRPr lang="en-US"/>
+          </a:p>
+        </p:txBody>
+      </p:sp>
+      <p:pic>
+        <p:nvPicPr>
+          <p:cNvPr id="11" name="Picture 10">
+            <a:extLst>
+              <a:ext uri="{FF2B5EF4-FFF2-40B4-BE49-F238E27FC236}">
+                <a16:creationId xmlns:a16="http://schemas.microsoft.com/office/drawing/2014/main" id="{D2785A03-7562-678B-E0E1-C527960D5326}"/>
+              </a:ext>
+            </a:extLst>
+          </p:cNvPr>
+          <p:cNvPicPr>
+            <a:picLocks noChangeAspect="1"/>
+          </p:cNvPicPr>
+          <p:nvPr/>
+        </p:nvPicPr>
+        <p:blipFill>
+          <a:blip r:embed="rId3"/>
+          <a:stretch>
+            <a:fillRect/>
+          </a:stretch>
+        </p:blipFill>
+        <p:spPr>
+          <a:xfrm>
+            <a:off x="6286454" y="3812510"/>
+            <a:ext cx="4022684" cy="3027103"/>
+          </a:xfrm>
+          <a:prstGeom prst="rect">
+            <a:avLst/>
+          </a:prstGeom>
+        </p:spPr>
+      </p:pic>
     </p:spTree>
     <p:extLst>
       <p:ext uri="{BB962C8B-B14F-4D97-AF65-F5344CB8AC3E}">
@@ -4678,10 +4735,10 @@
       </p:sp>
       <p:pic>
         <p:nvPicPr>
-          <p:cNvPr id="7" name="Picture 6">
-            <a:extLst>
-              <a:ext uri="{FF2B5EF4-FFF2-40B4-BE49-F238E27FC236}">
-                <a16:creationId xmlns:a16="http://schemas.microsoft.com/office/drawing/2014/main" id="{AC9EA2F2-1A2D-747A-6B5F-2F6E8A10C33A}"/>
+          <p:cNvPr id="5" name="Picture 4">
+            <a:extLst>
+              <a:ext uri="{FF2B5EF4-FFF2-40B4-BE49-F238E27FC236}">
+                <a16:creationId xmlns:a16="http://schemas.microsoft.com/office/drawing/2014/main" id="{258E62FA-7671-769E-4F22-B64BABF853B3}"/>
               </a:ext>
             </a:extLst>
           </p:cNvPr>
@@ -4698,8 +4755,8 @@
         </p:blipFill>
         <p:spPr>
           <a:xfrm>
-            <a:off x="3580014" y="3028453"/>
-            <a:ext cx="5031972" cy="3464422"/>
+            <a:off x="3566873" y="2817311"/>
+            <a:ext cx="5058254" cy="3808568"/>
           </a:xfrm>
           <a:prstGeom prst="rect">
             <a:avLst/>
@@ -4973,7 +5030,7 @@
                 <a:effectLst/>
                 <a:latin typeface="Courier New" panose="02070309020205020404" pitchFamily="49" charset="0"/>
               </a:rPr>
-              <a:t> เพื่อแทนที่ค่าที่ต้องการด้วยตัวเลขหรือตัวย่อสี และเก็บตารางที่แทนที่ข้อมูลแล้วไว้ในตัวแปรใหม่ เช่น </a:t>
+              <a:t> เพื่อแทนที่ค่าที่ต้องการด้วยตัวเลขหรือตัวย่อสี และเก็บตารางที่แทนที่ข้อมูลไว้ในตัวแปรใหม่ เช่น </a:t>
             </a:r>
           </a:p>
           <a:p>
@@ -5483,11 +5540,11 @@
             </a:r>
             <a:r>
               <a:rPr lang="en-US" dirty="0"/>
-              <a:t>Name </a:t>
+              <a:t>Name</a:t>
             </a:r>
             <a:r>
               <a:rPr lang="th-TH" dirty="0"/>
-              <a:t>ของตัวแปรตารางที่แทนที่ค่าแล้ว</a:t>
+              <a:t> ของตัวแปรตารางที่แทนที่ค่าแล้ว</a:t>
             </a:r>
             <a:endParaRPr lang="en-US" dirty="0"/>
           </a:p>
@@ -5510,39 +5567,59 @@
                 <a:effectLst/>
                 <a:latin typeface="Courier New" panose="02070309020205020404" pitchFamily="49" charset="0"/>
               </a:rPr>
-              <a:t>(</a:t>
+              <a:t>(df2[</a:t>
+            </a:r>
+            <a:r>
+              <a:rPr lang="en-US" sz="2000" b="0" i="0" dirty="0">
+                <a:solidFill>
+                  <a:srgbClr val="008000"/>
+                </a:solidFill>
+                <a:effectLst/>
+                <a:latin typeface="Courier New" panose="02070309020205020404" pitchFamily="49" charset="0"/>
+              </a:rPr>
+              <a:t>'</a:t>
             </a:r>
             <a:r>
               <a:rPr lang="en-US" sz="2000" b="0" i="0" dirty="0" err="1">
                 <a:solidFill>
-                  <a:srgbClr val="545454"/>
-                </a:solidFill>
-                <a:effectLst/>
-                <a:latin typeface="Courier New" panose="02070309020205020404" pitchFamily="49" charset="0"/>
-              </a:rPr>
-              <a:t>df</a:t>
-            </a:r>
-            <a:r>
-              <a:rPr lang="en-US" sz="2000" b="0" i="0" dirty="0">
-                <a:solidFill>
-                  <a:srgbClr val="545454"/>
-                </a:solidFill>
-                <a:effectLst/>
-                <a:latin typeface="Courier New" panose="02070309020205020404" pitchFamily="49" charset="0"/>
-              </a:rPr>
-              <a:t>[</a:t>
-            </a:r>
-            <a:r>
-              <a:rPr lang="en-US" sz="2000" b="0" i="0" dirty="0">
-                <a:solidFill>
                   <a:srgbClr val="008000"/>
                 </a:solidFill>
                 <a:effectLst/>
                 <a:latin typeface="Courier New" panose="02070309020205020404" pitchFamily="49" charset="0"/>
               </a:rPr>
+              <a:t>PetalLength</a:t>
+            </a:r>
+            <a:r>
+              <a:rPr lang="en-US" sz="2000" b="0" i="0" dirty="0">
+                <a:solidFill>
+                  <a:srgbClr val="008000"/>
+                </a:solidFill>
+                <a:effectLst/>
+                <a:latin typeface="Courier New" panose="02070309020205020404" pitchFamily="49" charset="0"/>
+              </a:rPr>
               <a:t>'</a:t>
             </a:r>
             <a:r>
+              <a:rPr lang="en-US" sz="2000" b="0" i="0" dirty="0">
+                <a:solidFill>
+                  <a:srgbClr val="545454"/>
+                </a:solidFill>
+                <a:effectLst/>
+                <a:latin typeface="Courier New" panose="02070309020205020404" pitchFamily="49" charset="0"/>
+              </a:rPr>
+              <a:t>],df2[</a:t>
+            </a:r>
+            <a:r>
+              <a:rPr lang="en-US" sz="2000" b="0" i="0" dirty="0">
+                <a:solidFill>
+                  <a:srgbClr val="008000"/>
+                </a:solidFill>
+                <a:effectLst/>
+                <a:latin typeface="Courier New" panose="02070309020205020404" pitchFamily="49" charset="0"/>
+              </a:rPr>
+              <a:t>'</a:t>
+            </a:r>
+            <a:r>
               <a:rPr lang="en-US" sz="2000" b="0" i="0" dirty="0" err="1">
                 <a:solidFill>
                   <a:srgbClr val="008000"/>
@@ -5550,67 +5627,7 @@
                 <a:effectLst/>
                 <a:latin typeface="Courier New" panose="02070309020205020404" pitchFamily="49" charset="0"/>
               </a:rPr>
-              <a:t>PetalLength</a:t>
-            </a:r>
-            <a:r>
-              <a:rPr lang="en-US" sz="2000" b="0" i="0" dirty="0">
-                <a:solidFill>
-                  <a:srgbClr val="008000"/>
-                </a:solidFill>
-                <a:effectLst/>
-                <a:latin typeface="Courier New" panose="02070309020205020404" pitchFamily="49" charset="0"/>
-              </a:rPr>
-              <a:t>'</a:t>
-            </a:r>
-            <a:r>
-              <a:rPr lang="en-US" sz="2000" b="0" i="0" dirty="0">
-                <a:solidFill>
-                  <a:srgbClr val="545454"/>
-                </a:solidFill>
-                <a:effectLst/>
-                <a:latin typeface="Courier New" panose="02070309020205020404" pitchFamily="49" charset="0"/>
-              </a:rPr>
-              <a:t>],</a:t>
-            </a:r>
-            <a:r>
-              <a:rPr lang="en-US" sz="2000" b="0" i="0" dirty="0" err="1">
-                <a:solidFill>
-                  <a:srgbClr val="545454"/>
-                </a:solidFill>
-                <a:effectLst/>
-                <a:latin typeface="Courier New" panose="02070309020205020404" pitchFamily="49" charset="0"/>
-              </a:rPr>
-              <a:t>df</a:t>
-            </a:r>
-            <a:r>
-              <a:rPr lang="en-US" sz="2000" b="0" i="0" dirty="0">
-                <a:solidFill>
-                  <a:srgbClr val="545454"/>
-                </a:solidFill>
-                <a:effectLst/>
-                <a:latin typeface="Courier New" panose="02070309020205020404" pitchFamily="49" charset="0"/>
-              </a:rPr>
-              <a:t>[</a:t>
-            </a:r>
-            <a:r>
-              <a:rPr lang="en-US" sz="2000" b="0" i="0" dirty="0">
-                <a:solidFill>
-                  <a:srgbClr val="008000"/>
-                </a:solidFill>
-                <a:effectLst/>
-                <a:latin typeface="Courier New" panose="02070309020205020404" pitchFamily="49" charset="0"/>
-              </a:rPr>
-              <a:t>'</a:t>
-            </a:r>
-            <a:r>
-              <a:rPr lang="en-US" sz="2000" b="0" i="0" dirty="0" err="1">
-                <a:solidFill>
-                  <a:srgbClr val="008000"/>
-                </a:solidFill>
-                <a:effectLst/>
-                <a:latin typeface="Courier New" panose="02070309020205020404" pitchFamily="49" charset="0"/>
-              </a:rPr>
-              <a:t>PetalWidth</a:t>
+              <a:t>SepalLength</a:t>
             </a:r>
             <a:r>
               <a:rPr lang="en-US" sz="2000" b="0" i="0" dirty="0">
@@ -5658,10 +5675,10 @@
       </p:sp>
       <p:pic>
         <p:nvPicPr>
-          <p:cNvPr id="5" name="Picture 4">
-            <a:extLst>
-              <a:ext uri="{FF2B5EF4-FFF2-40B4-BE49-F238E27FC236}">
-                <a16:creationId xmlns:a16="http://schemas.microsoft.com/office/drawing/2014/main" id="{C0DB29FB-1552-90AB-F2D9-F7D6948CCCCB}"/>
+          <p:cNvPr id="6" name="Picture 5">
+            <a:extLst>
+              <a:ext uri="{FF2B5EF4-FFF2-40B4-BE49-F238E27FC236}">
+                <a16:creationId xmlns:a16="http://schemas.microsoft.com/office/drawing/2014/main" id="{3D658111-B7AF-5561-E41C-DCCB0832D168}"/>
               </a:ext>
             </a:extLst>
           </p:cNvPr>
@@ -5678,8 +5695,8 @@
         </p:blipFill>
         <p:spPr>
           <a:xfrm>
-            <a:off x="3516284" y="3022222"/>
-            <a:ext cx="5159432" cy="3470653"/>
+            <a:off x="3541223" y="2883930"/>
+            <a:ext cx="5109554" cy="3847194"/>
           </a:xfrm>
           <a:prstGeom prst="rect">
             <a:avLst/>
@@ -5796,9 +5813,12 @@
             </a:r>
             <a:r>
               <a:rPr lang="th-TH" dirty="0"/>
-              <a:t> คือไม่โปรงแสง </a:t>
-            </a:r>
-            <a:endParaRPr lang="en-US" dirty="0"/>
+              <a:t> คือไม่โปรงแสง เพื่อให้มองเห็นจุดที่ถูกบัง (</a:t>
+            </a:r>
+            <a:r>
+              <a:rPr lang="en-US" dirty="0"/>
+              <a:t>Bubble Chart)</a:t>
+            </a:r>
           </a:p>
           <a:p>
             <a:r>
@@ -5819,36 +5839,56 @@
                 <a:effectLst/>
                 <a:latin typeface="Courier New" panose="02070309020205020404" pitchFamily="49" charset="0"/>
               </a:rPr>
-              <a:t>(</a:t>
+              <a:t>(df2[</a:t>
+            </a:r>
+            <a:r>
+              <a:rPr lang="en-US" sz="2000" b="0" i="0" dirty="0">
+                <a:solidFill>
+                  <a:srgbClr val="008000"/>
+                </a:solidFill>
+                <a:effectLst/>
+                <a:latin typeface="Courier New" panose="02070309020205020404" pitchFamily="49" charset="0"/>
+              </a:rPr>
+              <a:t>'</a:t>
             </a:r>
             <a:r>
               <a:rPr lang="en-US" sz="2000" b="0" i="0" dirty="0" err="1">
                 <a:solidFill>
-                  <a:srgbClr val="545454"/>
-                </a:solidFill>
-                <a:effectLst/>
-                <a:latin typeface="Courier New" panose="02070309020205020404" pitchFamily="49" charset="0"/>
-              </a:rPr>
-              <a:t>df</a:t>
-            </a:r>
-            <a:r>
-              <a:rPr lang="en-US" sz="2000" b="0" i="0" dirty="0">
-                <a:solidFill>
-                  <a:srgbClr val="545454"/>
-                </a:solidFill>
-                <a:effectLst/>
-                <a:latin typeface="Courier New" panose="02070309020205020404" pitchFamily="49" charset="0"/>
-              </a:rPr>
-              <a:t>[</a:t>
-            </a:r>
-            <a:r>
-              <a:rPr lang="en-US" sz="2000" b="0" i="0" dirty="0">
-                <a:solidFill>
                   <a:srgbClr val="008000"/>
                 </a:solidFill>
                 <a:effectLst/>
                 <a:latin typeface="Courier New" panose="02070309020205020404" pitchFamily="49" charset="0"/>
               </a:rPr>
+              <a:t>PetalLength</a:t>
+            </a:r>
+            <a:r>
+              <a:rPr lang="en-US" sz="2000" b="0" i="0" dirty="0">
+                <a:solidFill>
+                  <a:srgbClr val="008000"/>
+                </a:solidFill>
+                <a:effectLst/>
+                <a:latin typeface="Courier New" panose="02070309020205020404" pitchFamily="49" charset="0"/>
+              </a:rPr>
+              <a:t>’</a:t>
+            </a:r>
+            <a:r>
+              <a:rPr lang="en-US" sz="2000" b="0" i="0" dirty="0">
+                <a:solidFill>
+                  <a:srgbClr val="545454"/>
+                </a:solidFill>
+                <a:effectLst/>
+                <a:latin typeface="Courier New" panose="02070309020205020404" pitchFamily="49" charset="0"/>
+              </a:rPr>
+              <a:t>],df2[</a:t>
+            </a:r>
+            <a:r>
+              <a:rPr lang="en-US" sz="2000" b="0" i="0" dirty="0">
+                <a:solidFill>
+                  <a:srgbClr val="008000"/>
+                </a:solidFill>
+                <a:effectLst/>
+                <a:latin typeface="Courier New" panose="02070309020205020404" pitchFamily="49" charset="0"/>
+              </a:rPr>
               <a:t>'</a:t>
             </a:r>
             <a:r>
@@ -5859,67 +5899,7 @@
                 <a:effectLst/>
                 <a:latin typeface="Courier New" panose="02070309020205020404" pitchFamily="49" charset="0"/>
               </a:rPr>
-              <a:t>PetalLength</a:t>
-            </a:r>
-            <a:r>
-              <a:rPr lang="en-US" sz="2000" b="0" i="0" dirty="0">
-                <a:solidFill>
-                  <a:srgbClr val="008000"/>
-                </a:solidFill>
-                <a:effectLst/>
-                <a:latin typeface="Courier New" panose="02070309020205020404" pitchFamily="49" charset="0"/>
-              </a:rPr>
-              <a:t>’</a:t>
-            </a:r>
-            <a:r>
-              <a:rPr lang="en-US" sz="2000" b="0" i="0" dirty="0">
-                <a:solidFill>
-                  <a:srgbClr val="545454"/>
-                </a:solidFill>
-                <a:effectLst/>
-                <a:latin typeface="Courier New" panose="02070309020205020404" pitchFamily="49" charset="0"/>
-              </a:rPr>
-              <a:t>],</a:t>
-            </a:r>
-            <a:r>
-              <a:rPr lang="en-US" sz="2000" b="0" i="0" dirty="0" err="1">
-                <a:solidFill>
-                  <a:srgbClr val="545454"/>
-                </a:solidFill>
-                <a:effectLst/>
-                <a:latin typeface="Courier New" panose="02070309020205020404" pitchFamily="49" charset="0"/>
-              </a:rPr>
-              <a:t>df</a:t>
-            </a:r>
-            <a:r>
-              <a:rPr lang="en-US" sz="2000" b="0" i="0" dirty="0">
-                <a:solidFill>
-                  <a:srgbClr val="545454"/>
-                </a:solidFill>
-                <a:effectLst/>
-                <a:latin typeface="Courier New" panose="02070309020205020404" pitchFamily="49" charset="0"/>
-              </a:rPr>
-              <a:t>[</a:t>
-            </a:r>
-            <a:r>
-              <a:rPr lang="en-US" sz="2000" b="0" i="0" dirty="0">
-                <a:solidFill>
-                  <a:srgbClr val="008000"/>
-                </a:solidFill>
-                <a:effectLst/>
-                <a:latin typeface="Courier New" panose="02070309020205020404" pitchFamily="49" charset="0"/>
-              </a:rPr>
-              <a:t>'</a:t>
-            </a:r>
-            <a:r>
-              <a:rPr lang="en-US" sz="2000" b="0" i="0" dirty="0" err="1">
-                <a:solidFill>
-                  <a:srgbClr val="008000"/>
-                </a:solidFill>
-                <a:effectLst/>
-                <a:latin typeface="Courier New" panose="02070309020205020404" pitchFamily="49" charset="0"/>
-              </a:rPr>
-              <a:t>PetalWidth</a:t>
+              <a:t>SepalLength</a:t>
             </a:r>
             <a:r>
               <a:rPr lang="en-US" sz="2000" b="0" i="0" dirty="0">
@@ -5987,10 +5967,10 @@
       </p:sp>
       <p:pic>
         <p:nvPicPr>
-          <p:cNvPr id="6" name="Picture 5">
-            <a:extLst>
-              <a:ext uri="{FF2B5EF4-FFF2-40B4-BE49-F238E27FC236}">
-                <a16:creationId xmlns:a16="http://schemas.microsoft.com/office/drawing/2014/main" id="{6A97644C-4A69-DE07-A6E8-1EA5E983FA47}"/>
+          <p:cNvPr id="5" name="Picture 4">
+            <a:extLst>
+              <a:ext uri="{FF2B5EF4-FFF2-40B4-BE49-F238E27FC236}">
+                <a16:creationId xmlns:a16="http://schemas.microsoft.com/office/drawing/2014/main" id="{1EB1865A-29F0-8EC7-CDF0-4965193A9CC6}"/>
               </a:ext>
             </a:extLst>
           </p:cNvPr>
@@ -6007,8 +5987,8 @@
         </p:blipFill>
         <p:spPr>
           <a:xfrm>
-            <a:off x="3516284" y="3224714"/>
-            <a:ext cx="5159432" cy="3484292"/>
+            <a:off x="3780676" y="3241964"/>
+            <a:ext cx="4630648" cy="3476884"/>
           </a:xfrm>
           <a:prstGeom prst="rect">
             <a:avLst/>

</xml_diff>

<commit_message>
Class period 14 finish and add iris picture to class period 12
</commit_message>
<xml_diff>
--- a/PPT/Class period 12.pptx
+++ b/PPT/Class period 12.pptx
@@ -8,11 +8,12 @@
     <p:sldId id="466" r:id="rId2"/>
     <p:sldId id="474" r:id="rId3"/>
     <p:sldId id="469" r:id="rId4"/>
-    <p:sldId id="470" r:id="rId5"/>
-    <p:sldId id="471" r:id="rId6"/>
-    <p:sldId id="472" r:id="rId7"/>
-    <p:sldId id="473" r:id="rId8"/>
-    <p:sldId id="475" r:id="rId9"/>
+    <p:sldId id="503" r:id="rId5"/>
+    <p:sldId id="470" r:id="rId6"/>
+    <p:sldId id="471" r:id="rId7"/>
+    <p:sldId id="472" r:id="rId8"/>
+    <p:sldId id="473" r:id="rId9"/>
+    <p:sldId id="475" r:id="rId10"/>
   </p:sldIdLst>
   <p:sldSz cx="12192000" cy="6858000"/>
   <p:notesSz cx="6858000" cy="9144000"/>
@@ -266,7 +267,7 @@
           <a:p>
             <a:fld id="{E10378E5-6EF0-46B6-A2C4-A173DBC89C5F}" type="datetimeFigureOut">
               <a:rPr lang="en-US" smtClean="0"/>
-              <a:t>3/18/2024</a:t>
+              <a:t>3/19/2024</a:t>
             </a:fld>
             <a:endParaRPr lang="en-US"/>
           </a:p>
@@ -464,7 +465,7 @@
           <a:p>
             <a:fld id="{E10378E5-6EF0-46B6-A2C4-A173DBC89C5F}" type="datetimeFigureOut">
               <a:rPr lang="en-US" smtClean="0"/>
-              <a:t>3/18/2024</a:t>
+              <a:t>3/19/2024</a:t>
             </a:fld>
             <a:endParaRPr lang="en-US"/>
           </a:p>
@@ -672,7 +673,7 @@
           <a:p>
             <a:fld id="{E10378E5-6EF0-46B6-A2C4-A173DBC89C5F}" type="datetimeFigureOut">
               <a:rPr lang="en-US" smtClean="0"/>
-              <a:t>3/18/2024</a:t>
+              <a:t>3/19/2024</a:t>
             </a:fld>
             <a:endParaRPr lang="en-US"/>
           </a:p>
@@ -870,7 +871,7 @@
           <a:p>
             <a:fld id="{E10378E5-6EF0-46B6-A2C4-A173DBC89C5F}" type="datetimeFigureOut">
               <a:rPr lang="en-US" smtClean="0"/>
-              <a:t>3/18/2024</a:t>
+              <a:t>3/19/2024</a:t>
             </a:fld>
             <a:endParaRPr lang="en-US"/>
           </a:p>
@@ -1145,7 +1146,7 @@
           <a:p>
             <a:fld id="{E10378E5-6EF0-46B6-A2C4-A173DBC89C5F}" type="datetimeFigureOut">
               <a:rPr lang="en-US" smtClean="0"/>
-              <a:t>3/18/2024</a:t>
+              <a:t>3/19/2024</a:t>
             </a:fld>
             <a:endParaRPr lang="en-US"/>
           </a:p>
@@ -1410,7 +1411,7 @@
           <a:p>
             <a:fld id="{E10378E5-6EF0-46B6-A2C4-A173DBC89C5F}" type="datetimeFigureOut">
               <a:rPr lang="en-US" smtClean="0"/>
-              <a:t>3/18/2024</a:t>
+              <a:t>3/19/2024</a:t>
             </a:fld>
             <a:endParaRPr lang="en-US"/>
           </a:p>
@@ -1822,7 +1823,7 @@
           <a:p>
             <a:fld id="{E10378E5-6EF0-46B6-A2C4-A173DBC89C5F}" type="datetimeFigureOut">
               <a:rPr lang="en-US" smtClean="0"/>
-              <a:t>3/18/2024</a:t>
+              <a:t>3/19/2024</a:t>
             </a:fld>
             <a:endParaRPr lang="en-US"/>
           </a:p>
@@ -1963,7 +1964,7 @@
           <a:p>
             <a:fld id="{E10378E5-6EF0-46B6-A2C4-A173DBC89C5F}" type="datetimeFigureOut">
               <a:rPr lang="en-US" smtClean="0"/>
-              <a:t>3/18/2024</a:t>
+              <a:t>3/19/2024</a:t>
             </a:fld>
             <a:endParaRPr lang="en-US"/>
           </a:p>
@@ -2076,7 +2077,7 @@
           <a:p>
             <a:fld id="{E10378E5-6EF0-46B6-A2C4-A173DBC89C5F}" type="datetimeFigureOut">
               <a:rPr lang="en-US" smtClean="0"/>
-              <a:t>3/18/2024</a:t>
+              <a:t>3/19/2024</a:t>
             </a:fld>
             <a:endParaRPr lang="en-US"/>
           </a:p>
@@ -2387,7 +2388,7 @@
           <a:p>
             <a:fld id="{E10378E5-6EF0-46B6-A2C4-A173DBC89C5F}" type="datetimeFigureOut">
               <a:rPr lang="en-US" smtClean="0"/>
-              <a:t>3/18/2024</a:t>
+              <a:t>3/19/2024</a:t>
             </a:fld>
             <a:endParaRPr lang="en-US"/>
           </a:p>
@@ -2675,7 +2676,7 @@
           <a:p>
             <a:fld id="{E10378E5-6EF0-46B6-A2C4-A173DBC89C5F}" type="datetimeFigureOut">
               <a:rPr lang="en-US" smtClean="0"/>
-              <a:t>3/18/2024</a:t>
+              <a:t>3/19/2024</a:t>
             </a:fld>
             <a:endParaRPr lang="en-US"/>
           </a:p>
@@ -2916,7 +2917,7 @@
           <a:p>
             <a:fld id="{E10378E5-6EF0-46B6-A2C4-A173DBC89C5F}" type="datetimeFigureOut">
               <a:rPr lang="en-US" smtClean="0"/>
-              <a:t>3/18/2024</a:t>
+              <a:t>3/19/2024</a:t>
             </a:fld>
             <a:endParaRPr lang="en-US"/>
           </a:p>
@@ -3585,7 +3586,10 @@
               <a:rPr lang="th-TH" dirty="0"/>
               <a:t>การแสดงผลการกระจายของข้อมูล</a:t>
             </a:r>
-            <a:endParaRPr lang="en-US" dirty="0"/>
+            <a:r>
+              <a:rPr lang="en-US" dirty="0"/>
+              <a:t> Scatter Plot </a:t>
+            </a:r>
           </a:p>
         </p:txBody>
       </p:sp>
@@ -3932,6 +3936,98 @@
 </file>
 
 <file path=ppt/slides/slide4.xml><?xml version="1.0" encoding="utf-8"?>
+<p:sld xmlns:a="http://schemas.openxmlformats.org/drawingml/2006/main" xmlns:r="http://schemas.openxmlformats.org/officeDocument/2006/relationships" xmlns:p="http://schemas.openxmlformats.org/presentationml/2006/main">
+  <p:cSld>
+    <p:spTree>
+      <p:nvGrpSpPr>
+        <p:cNvPr id="1" name=""/>
+        <p:cNvGrpSpPr/>
+        <p:nvPr/>
+      </p:nvGrpSpPr>
+      <p:grpSpPr>
+        <a:xfrm>
+          <a:off x="0" y="0"/>
+          <a:ext cx="0" cy="0"/>
+          <a:chOff x="0" y="0"/>
+          <a:chExt cx="0" cy="0"/>
+        </a:xfrm>
+      </p:grpSpPr>
+      <p:sp>
+        <p:nvSpPr>
+          <p:cNvPr id="2" name="Title 1">
+            <a:extLst>
+              <a:ext uri="{FF2B5EF4-FFF2-40B4-BE49-F238E27FC236}">
+                <a16:creationId xmlns:a16="http://schemas.microsoft.com/office/drawing/2014/main" id="{9F630F66-9524-B849-F8C6-778C7FE2B7C9}"/>
+              </a:ext>
+            </a:extLst>
+          </p:cNvPr>
+          <p:cNvSpPr>
+            <a:spLocks noGrp="1"/>
+          </p:cNvSpPr>
+          <p:nvPr>
+            <p:ph type="title"/>
+          </p:nvPr>
+        </p:nvSpPr>
+        <p:spPr/>
+        <p:txBody>
+          <a:bodyPr/>
+          <a:lstStyle/>
+          <a:p>
+            <a:r>
+              <a:rPr lang="th-TH" dirty="0"/>
+              <a:t>ดอกไม้ </a:t>
+            </a:r>
+            <a:r>
+              <a:rPr lang="en-US" dirty="0"/>
+              <a:t>iris </a:t>
+            </a:r>
+          </a:p>
+        </p:txBody>
+      </p:sp>
+      <p:pic>
+        <p:nvPicPr>
+          <p:cNvPr id="5" name="Picture 4">
+            <a:extLst>
+              <a:ext uri="{FF2B5EF4-FFF2-40B4-BE49-F238E27FC236}">
+                <a16:creationId xmlns:a16="http://schemas.microsoft.com/office/drawing/2014/main" id="{0A3B35B9-C452-E71A-41DA-51B7E0D3A219}"/>
+              </a:ext>
+            </a:extLst>
+          </p:cNvPr>
+          <p:cNvPicPr>
+            <a:picLocks noChangeAspect="1"/>
+          </p:cNvPicPr>
+          <p:nvPr/>
+        </p:nvPicPr>
+        <p:blipFill>
+          <a:blip r:embed="rId2"/>
+          <a:stretch>
+            <a:fillRect/>
+          </a:stretch>
+        </p:blipFill>
+        <p:spPr>
+          <a:xfrm>
+            <a:off x="1781129" y="1959900"/>
+            <a:ext cx="8629742" cy="3942136"/>
+          </a:xfrm>
+          <a:prstGeom prst="rect">
+            <a:avLst/>
+          </a:prstGeom>
+        </p:spPr>
+      </p:pic>
+    </p:spTree>
+    <p:extLst>
+      <p:ext uri="{BB962C8B-B14F-4D97-AF65-F5344CB8AC3E}">
+        <p14:creationId xmlns:p14="http://schemas.microsoft.com/office/powerpoint/2010/main" val="2700501380"/>
+      </p:ext>
+    </p:extLst>
+  </p:cSld>
+  <p:clrMapOvr>
+    <a:masterClrMapping/>
+  </p:clrMapOvr>
+</p:sld>
+</file>
+
+<file path=ppt/slides/slide5.xml><?xml version="1.0" encoding="utf-8"?>
 <p:sld xmlns:a="http://schemas.openxmlformats.org/drawingml/2006/main" xmlns:r="http://schemas.openxmlformats.org/officeDocument/2006/relationships" xmlns:p="http://schemas.openxmlformats.org/presentationml/2006/main">
   <p:cSld>
     <p:spTree>
@@ -4441,7 +4537,7 @@
 </p:sld>
 </file>
 
-<file path=ppt/slides/slide5.xml><?xml version="1.0" encoding="utf-8"?>
+<file path=ppt/slides/slide6.xml><?xml version="1.0" encoding="utf-8"?>
 <p:sld xmlns:a="http://schemas.openxmlformats.org/drawingml/2006/main" xmlns:r="http://schemas.openxmlformats.org/officeDocument/2006/relationships" xmlns:p="http://schemas.openxmlformats.org/presentationml/2006/main">
   <p:cSld>
     <p:spTree>
@@ -4776,7 +4872,7 @@
 </p:sld>
 </file>
 
-<file path=ppt/slides/slide6.xml><?xml version="1.0" encoding="utf-8"?>
+<file path=ppt/slides/slide7.xml><?xml version="1.0" encoding="utf-8"?>
 <p:sld xmlns:a="http://schemas.openxmlformats.org/drawingml/2006/main" xmlns:r="http://schemas.openxmlformats.org/officeDocument/2006/relationships" xmlns:p="http://schemas.openxmlformats.org/presentationml/2006/main">
   <p:cSld>
     <p:spTree>
@@ -5455,7 +5551,7 @@
 </p:sld>
 </file>
 
-<file path=ppt/slides/slide7.xml><?xml version="1.0" encoding="utf-8"?>
+<file path=ppt/slides/slide8.xml><?xml version="1.0" encoding="utf-8"?>
 <p:sld xmlns:a="http://schemas.openxmlformats.org/drawingml/2006/main" xmlns:r="http://schemas.openxmlformats.org/officeDocument/2006/relationships" xmlns:p="http://schemas.openxmlformats.org/presentationml/2006/main">
   <p:cSld>
     <p:spTree>
@@ -5716,7 +5812,7 @@
 </p:sld>
 </file>
 
-<file path=ppt/slides/slide8.xml><?xml version="1.0" encoding="utf-8"?>
+<file path=ppt/slides/slide9.xml><?xml version="1.0" encoding="utf-8"?>
 <p:sld xmlns:a="http://schemas.openxmlformats.org/drawingml/2006/main" xmlns:r="http://schemas.openxmlformats.org/officeDocument/2006/relationships" xmlns:p="http://schemas.openxmlformats.org/presentationml/2006/main">
   <p:cSld>
     <p:spTree>

</xml_diff>